<commit_message>
Added additional test files for data testing: .xml, .odp, .pptm, .ppsx, ppsm, .pps
</commit_message>
<xml_diff>
--- a/test-data/1.pptx
+++ b/test-data/1.pptx
@@ -290,7 +290,7 @@
             <a:fld id="{1D8BD707-D9CF-40AE-B4C6-C98DA3205C09}" type="datetimeFigureOut">
               <a:rPr lang="en-US" smtClean="0"/>
               <a:pPr/>
-              <a:t>6/21/2014</a:t>
+              <a:t>7/3/2014</a:t>
             </a:fld>
             <a:endParaRPr lang="en-US"/>
           </a:p>
@@ -457,7 +457,7 @@
             <a:fld id="{1D8BD707-D9CF-40AE-B4C6-C98DA3205C09}" type="datetimeFigureOut">
               <a:rPr lang="en-US" smtClean="0"/>
               <a:pPr/>
-              <a:t>6/21/2014</a:t>
+              <a:t>7/3/2014</a:t>
             </a:fld>
             <a:endParaRPr lang="en-US"/>
           </a:p>
@@ -634,7 +634,7 @@
             <a:fld id="{1D8BD707-D9CF-40AE-B4C6-C98DA3205C09}" type="datetimeFigureOut">
               <a:rPr lang="en-US" smtClean="0"/>
               <a:pPr/>
-              <a:t>6/21/2014</a:t>
+              <a:t>7/3/2014</a:t>
             </a:fld>
             <a:endParaRPr lang="en-US"/>
           </a:p>
@@ -801,7 +801,7 @@
             <a:fld id="{1D8BD707-D9CF-40AE-B4C6-C98DA3205C09}" type="datetimeFigureOut">
               <a:rPr lang="en-US" smtClean="0"/>
               <a:pPr/>
-              <a:t>6/21/2014</a:t>
+              <a:t>7/3/2014</a:t>
             </a:fld>
             <a:endParaRPr lang="en-US"/>
           </a:p>
@@ -1044,7 +1044,7 @@
             <a:fld id="{1D8BD707-D9CF-40AE-B4C6-C98DA3205C09}" type="datetimeFigureOut">
               <a:rPr lang="en-US" smtClean="0"/>
               <a:pPr/>
-              <a:t>6/21/2014</a:t>
+              <a:t>7/3/2014</a:t>
             </a:fld>
             <a:endParaRPr lang="en-US"/>
           </a:p>
@@ -1329,7 +1329,7 @@
             <a:fld id="{1D8BD707-D9CF-40AE-B4C6-C98DA3205C09}" type="datetimeFigureOut">
               <a:rPr lang="en-US" smtClean="0"/>
               <a:pPr/>
-              <a:t>6/21/2014</a:t>
+              <a:t>7/3/2014</a:t>
             </a:fld>
             <a:endParaRPr lang="en-US"/>
           </a:p>
@@ -1748,7 +1748,7 @@
             <a:fld id="{1D8BD707-D9CF-40AE-B4C6-C98DA3205C09}" type="datetimeFigureOut">
               <a:rPr lang="en-US" smtClean="0"/>
               <a:pPr/>
-              <a:t>6/21/2014</a:t>
+              <a:t>7/3/2014</a:t>
             </a:fld>
             <a:endParaRPr lang="en-US"/>
           </a:p>
@@ -1863,7 +1863,7 @@
             <a:fld id="{1D8BD707-D9CF-40AE-B4C6-C98DA3205C09}" type="datetimeFigureOut">
               <a:rPr lang="en-US" smtClean="0"/>
               <a:pPr/>
-              <a:t>6/21/2014</a:t>
+              <a:t>7/3/2014</a:t>
             </a:fld>
             <a:endParaRPr lang="en-US"/>
           </a:p>
@@ -1955,7 +1955,7 @@
             <a:fld id="{1D8BD707-D9CF-40AE-B4C6-C98DA3205C09}" type="datetimeFigureOut">
               <a:rPr lang="en-US" smtClean="0"/>
               <a:pPr/>
-              <a:t>6/21/2014</a:t>
+              <a:t>7/3/2014</a:t>
             </a:fld>
             <a:endParaRPr lang="en-US"/>
           </a:p>
@@ -2229,7 +2229,7 @@
             <a:fld id="{1D8BD707-D9CF-40AE-B4C6-C98DA3205C09}" type="datetimeFigureOut">
               <a:rPr lang="en-US" smtClean="0"/>
               <a:pPr/>
-              <a:t>6/21/2014</a:t>
+              <a:t>7/3/2014</a:t>
             </a:fld>
             <a:endParaRPr lang="en-US"/>
           </a:p>
@@ -2479,7 +2479,7 @@
             <a:fld id="{1D8BD707-D9CF-40AE-B4C6-C98DA3205C09}" type="datetimeFigureOut">
               <a:rPr lang="en-US" smtClean="0"/>
               <a:pPr/>
-              <a:t>6/21/2014</a:t>
+              <a:t>7/3/2014</a:t>
             </a:fld>
             <a:endParaRPr lang="en-US"/>
           </a:p>
@@ -2689,7 +2689,7 @@
             <a:fld id="{1D8BD707-D9CF-40AE-B4C6-C98DA3205C09}" type="datetimeFigureOut">
               <a:rPr lang="en-US" smtClean="0"/>
               <a:pPr/>
-              <a:t>6/21/2014</a:t>
+              <a:t>7/3/2014</a:t>
             </a:fld>
             <a:endParaRPr lang="en-US"/>
           </a:p>
@@ -3077,7 +3077,7 @@
           <a:p>
             <a:r>
               <a:rPr lang="en-GB" dirty="0" smtClean="0"/>
-              <a:t>1-1</a:t>
+              <a:t>Presentation: 1.pptx</a:t>
             </a:r>
             <a:endParaRPr lang="en-GB" dirty="0"/>
           </a:p>
@@ -3098,7 +3098,11 @@
           <a:bodyPr/>
           <a:lstStyle/>
           <a:p>
-            <a:endParaRPr lang="en-GB"/>
+            <a:r>
+              <a:rPr lang="en-GB" dirty="0" smtClean="0"/>
+              <a:t>Slide #1</a:t>
+            </a:r>
+            <a:endParaRPr lang="en-GB" dirty="0"/>
           </a:p>
         </p:txBody>
       </p:sp>
@@ -3139,45 +3143,49 @@
             <a:spLocks noGrp="1"/>
           </p:cNvSpPr>
           <p:nvPr>
-            <p:ph type="title"/>
-          </p:nvPr>
-        </p:nvSpPr>
-        <p:spPr/>
-        <p:txBody>
-          <a:bodyPr/>
-          <a:lstStyle/>
-          <a:p>
-            <a:r>
-              <a:rPr lang="en-GB" smtClean="0"/>
-              <a:t>1-2</a:t>
-            </a:r>
-            <a:endParaRPr lang="en-GB"/>
-          </a:p>
-        </p:txBody>
-      </p:sp>
-      <p:sp>
-        <p:nvSpPr>
-          <p:cNvPr id="3" name="Content Placeholder 2"/>
-          <p:cNvSpPr>
-            <a:spLocks noGrp="1"/>
-          </p:cNvSpPr>
-          <p:nvPr>
-            <p:ph idx="1"/>
-          </p:nvPr>
-        </p:nvSpPr>
-        <p:spPr/>
-        <p:txBody>
-          <a:bodyPr/>
-          <a:lstStyle/>
-          <a:p>
-            <a:endParaRPr lang="en-GB"/>
+            <p:ph type="ctrTitle"/>
+          </p:nvPr>
+        </p:nvSpPr>
+        <p:spPr/>
+        <p:txBody>
+          <a:bodyPr/>
+          <a:lstStyle/>
+          <a:p>
+            <a:r>
+              <a:rPr lang="en-GB" dirty="0" smtClean="0"/>
+              <a:t>Presentation: 1.pptx</a:t>
+            </a:r>
+            <a:endParaRPr lang="en-GB" dirty="0"/>
+          </a:p>
+        </p:txBody>
+      </p:sp>
+      <p:sp>
+        <p:nvSpPr>
+          <p:cNvPr id="3" name="Subtitle 2"/>
+          <p:cNvSpPr>
+            <a:spLocks noGrp="1"/>
+          </p:cNvSpPr>
+          <p:nvPr>
+            <p:ph type="subTitle" idx="1"/>
+          </p:nvPr>
+        </p:nvSpPr>
+        <p:spPr/>
+        <p:txBody>
+          <a:bodyPr/>
+          <a:lstStyle/>
+          <a:p>
+            <a:r>
+              <a:rPr lang="en-GB" dirty="0" smtClean="0"/>
+              <a:t>Slide #2</a:t>
+            </a:r>
+            <a:endParaRPr lang="en-GB" dirty="0"/>
           </a:p>
         </p:txBody>
       </p:sp>
     </p:spTree>
     <p:extLst>
       <p:ext uri="{BB962C8B-B14F-4D97-AF65-F5344CB8AC3E}">
-        <p14:creationId xmlns:p14="http://schemas.microsoft.com/office/powerpoint/2010/main" val="2664103629"/>
+        <p14:creationId xmlns:p14="http://schemas.microsoft.com/office/powerpoint/2010/main" val="2510872056"/>
       </p:ext>
     </p:extLst>
   </p:cSld>

</xml_diff>